<commit_message>
some figures are modified
</commit_message>
<xml_diff>
--- a/hexabenzocoronene/sto3g/correlation/correlation.pptx
+++ b/hexabenzocoronene/sto3g/correlation/correlation.pptx
@@ -5798,7 +5798,7 @@
           </p:nvSpPr>
           <p:spPr>
             <a:xfrm>
-              <a:off x="7437037" y="5401493"/>
+              <a:off x="7377260" y="5372057"/>
               <a:ext cx="312906" cy="369332"/>
             </a:xfrm>
             <a:prstGeom prst="rect">
@@ -5837,7 +5837,7 @@
           </p:nvSpPr>
           <p:spPr>
             <a:xfrm>
-              <a:off x="7932315" y="5870705"/>
+              <a:off x="7833066" y="5815702"/>
               <a:ext cx="312906" cy="369332"/>
             </a:xfrm>
             <a:prstGeom prst="rect">
@@ -5876,7 +5876,7 @@
           </p:nvSpPr>
           <p:spPr>
             <a:xfrm>
-              <a:off x="8367220" y="6292656"/>
+              <a:off x="8353564" y="6255860"/>
               <a:ext cx="312906" cy="369332"/>
             </a:xfrm>
             <a:prstGeom prst="rect">
@@ -5915,7 +5915,7 @@
           </p:nvSpPr>
           <p:spPr>
             <a:xfrm>
-              <a:off x="8872808" y="6747617"/>
+              <a:off x="8782860" y="6688073"/>
               <a:ext cx="312906" cy="369332"/>
             </a:xfrm>
             <a:prstGeom prst="rect">
@@ -5954,7 +5954,7 @@
           </p:nvSpPr>
           <p:spPr>
             <a:xfrm>
-              <a:off x="9317782" y="7206602"/>
+              <a:off x="9288359" y="7154295"/>
               <a:ext cx="312906" cy="369332"/>
             </a:xfrm>
             <a:prstGeom prst="rect">
@@ -5993,7 +5993,7 @@
           </p:nvSpPr>
           <p:spPr>
             <a:xfrm>
-              <a:off x="9791250" y="7651767"/>
+              <a:off x="9734167" y="7606819"/>
               <a:ext cx="312906" cy="369332"/>
             </a:xfrm>
             <a:prstGeom prst="rect">

</xml_diff>